<commit_message>
Update business plan mHeart
Update business plan presentation for mHeart
</commit_message>
<xml_diff>
--- a/10_Management/70_Business_Plan/mHeart/Business_Plan_Heart.pptx
+++ b/10_Management/70_Business_Plan/mHeart/Business_Plan_Heart.pptx
@@ -4,6 +4,9 @@
   <p:sldMasterIdLst>
     <p:sldMasterId id="2147483660" r:id="rId1"/>
   </p:sldMasterIdLst>
+  <p:notesMasterIdLst>
+    <p:notesMasterId r:id="rId6"/>
+  </p:notesMasterIdLst>
   <p:sldIdLst>
     <p:sldId id="256" r:id="rId2"/>
     <p:sldId id="259" r:id="rId3"/>
@@ -2614,9 +2617,495 @@
 </c:chartSpace>
 </file>
 
+<file path=ppt/charts/chart3.xml><?xml version="1.0" encoding="utf-8"?>
+<c:chartSpace xmlns:c="http://schemas.openxmlformats.org/drawingml/2006/chart" xmlns:a="http://schemas.openxmlformats.org/drawingml/2006/main" xmlns:r="http://schemas.openxmlformats.org/officeDocument/2006/relationships" xmlns:c16r2="http://schemas.microsoft.com/office/drawing/2015/06/chart">
+  <c:date1904 val="0"/>
+  <c:lang val="en-US"/>
+  <c:roundedCorners val="0"/>
+  <mc:AlternateContent xmlns:mc="http://schemas.openxmlformats.org/markup-compatibility/2006">
+    <mc:Choice xmlns:c14="http://schemas.microsoft.com/office/drawing/2007/8/2/chart" Requires="c14">
+      <c14:style val="102"/>
+    </mc:Choice>
+    <mc:Fallback>
+      <c:style val="2"/>
+    </mc:Fallback>
+  </mc:AlternateContent>
+  <c:chart>
+    <c:autoTitleDeleted val="1"/>
+    <c:plotArea>
+      <c:layout/>
+      <c:barChart>
+        <c:barDir val="col"/>
+        <c:grouping val="stacked"/>
+        <c:varyColors val="0"/>
+        <c:ser>
+          <c:idx val="0"/>
+          <c:order val="0"/>
+          <c:tx>
+            <c:strRef>
+              <c:f>Sheet1!$B$1</c:f>
+              <c:strCache>
+                <c:ptCount val="1"/>
+                <c:pt idx="0">
+                  <c:v>Smart Devices</c:v>
+                </c:pt>
+              </c:strCache>
+            </c:strRef>
+          </c:tx>
+          <c:spPr>
+            <a:solidFill>
+              <a:schemeClr val="tx1"/>
+            </a:solidFill>
+            <a:ln>
+              <a:noFill/>
+            </a:ln>
+            <a:effectLst/>
+          </c:spPr>
+          <c:invertIfNegative val="0"/>
+          <c:dLbls>
+            <c:spPr>
+              <a:noFill/>
+              <a:ln>
+                <a:noFill/>
+              </a:ln>
+              <a:effectLst/>
+            </c:spPr>
+            <c:txPr>
+              <a:bodyPr rot="0" spcFirstLastPara="1" vertOverflow="ellipsis" vert="horz" wrap="square" lIns="38100" tIns="19050" rIns="38100" bIns="19050" anchor="ctr" anchorCtr="1">
+                <a:spAutoFit/>
+              </a:bodyPr>
+              <a:lstStyle/>
+              <a:p>
+                <a:pPr>
+                  <a:defRPr sz="1197" b="1" i="0" u="none" strike="noStrike" kern="1200" baseline="0">
+                    <a:solidFill>
+                      <a:schemeClr val="bg1"/>
+                    </a:solidFill>
+                    <a:latin typeface="Calibri" panose="020F0502020204030204" pitchFamily="34" charset="0"/>
+                    <a:ea typeface="+mn-ea"/>
+                    <a:cs typeface="Calibri" panose="020F0502020204030204" pitchFamily="34" charset="0"/>
+                  </a:defRPr>
+                </a:pPr>
+                <a:endParaRPr lang="en-US"/>
+              </a:p>
+            </c:txPr>
+            <c:dLblPos val="inBase"/>
+            <c:showLegendKey val="0"/>
+            <c:showVal val="1"/>
+            <c:showCatName val="0"/>
+            <c:showSerName val="0"/>
+            <c:showPercent val="0"/>
+            <c:showBubbleSize val="0"/>
+            <c:showLeaderLines val="0"/>
+            <c:extLst>
+              <c:ext xmlns:c15="http://schemas.microsoft.com/office/drawing/2012/chart" uri="{CE6537A1-D6FC-4f65-9D91-7224C49458BB}">
+                <c15:showLeaderLines val="1"/>
+                <c15:leaderLines>
+                  <c:spPr>
+                    <a:ln w="9525" cap="flat" cmpd="sng" algn="ctr">
+                      <a:solidFill>
+                        <a:schemeClr val="tx1">
+                          <a:lumMod val="35000"/>
+                          <a:lumOff val="65000"/>
+                        </a:schemeClr>
+                      </a:solidFill>
+                      <a:round/>
+                    </a:ln>
+                    <a:effectLst/>
+                  </c:spPr>
+                </c15:leaderLines>
+              </c:ext>
+            </c:extLst>
+          </c:dLbls>
+          <c:cat>
+            <c:numRef>
+              <c:f>Sheet1!$A$2:$A$7</c:f>
+              <c:numCache>
+                <c:formatCode>General</c:formatCode>
+                <c:ptCount val="6"/>
+                <c:pt idx="0">
+                  <c:v>2017</c:v>
+                </c:pt>
+                <c:pt idx="1">
+                  <c:v>2018</c:v>
+                </c:pt>
+                <c:pt idx="2">
+                  <c:v>2019</c:v>
+                </c:pt>
+                <c:pt idx="3">
+                  <c:v>2020</c:v>
+                </c:pt>
+                <c:pt idx="4">
+                  <c:v>2021</c:v>
+                </c:pt>
+                <c:pt idx="5">
+                  <c:v>2022</c:v>
+                </c:pt>
+              </c:numCache>
+            </c:numRef>
+          </c:cat>
+          <c:val>
+            <c:numRef>
+              <c:f>Sheet1!$B$2:$B$7</c:f>
+              <c:numCache>
+                <c:formatCode>[$$-409]#,##0.0"M"</c:formatCode>
+                <c:ptCount val="6"/>
+                <c:pt idx="0">
+                  <c:v>27.1</c:v>
+                </c:pt>
+                <c:pt idx="1">
+                  <c:v>29.1</c:v>
+                </c:pt>
+                <c:pt idx="2">
+                  <c:v>31.3</c:v>
+                </c:pt>
+                <c:pt idx="3">
+                  <c:v>33.5</c:v>
+                </c:pt>
+                <c:pt idx="4">
+                  <c:v>35.4</c:v>
+                </c:pt>
+                <c:pt idx="5">
+                  <c:v>36.9</c:v>
+                </c:pt>
+              </c:numCache>
+            </c:numRef>
+          </c:val>
+          <c:extLst>
+            <c:ext xmlns:c16="http://schemas.microsoft.com/office/drawing/2014/chart" uri="{C3380CC4-5D6E-409C-BE32-E72D297353CC}">
+              <c16:uniqueId val="{00000000-5605-43E6-8ED8-7F070BC72AB4}"/>
+            </c:ext>
+          </c:extLst>
+        </c:ser>
+        <c:ser>
+          <c:idx val="1"/>
+          <c:order val="1"/>
+          <c:tx>
+            <c:strRef>
+              <c:f>Sheet1!$C$1</c:f>
+              <c:strCache>
+                <c:ptCount val="1"/>
+                <c:pt idx="0">
+                  <c:v>Apps</c:v>
+                </c:pt>
+              </c:strCache>
+            </c:strRef>
+          </c:tx>
+          <c:spPr>
+            <a:solidFill>
+              <a:schemeClr val="tx1">
+                <a:lumMod val="40000"/>
+                <a:lumOff val="60000"/>
+              </a:schemeClr>
+            </a:solidFill>
+            <a:ln>
+              <a:noFill/>
+            </a:ln>
+            <a:effectLst/>
+          </c:spPr>
+          <c:invertIfNegative val="0"/>
+          <c:dLbls>
+            <c:spPr>
+              <a:noFill/>
+              <a:ln>
+                <a:noFill/>
+              </a:ln>
+              <a:effectLst/>
+            </c:spPr>
+            <c:txPr>
+              <a:bodyPr rot="0" spcFirstLastPara="1" vertOverflow="ellipsis" vert="horz" wrap="square" lIns="38100" tIns="19050" rIns="38100" bIns="19050" anchor="ctr" anchorCtr="1">
+                <a:spAutoFit/>
+              </a:bodyPr>
+              <a:lstStyle/>
+              <a:p>
+                <a:pPr>
+                  <a:defRPr sz="1197" b="1" i="0" u="none" strike="noStrike" kern="1200" baseline="0">
+                    <a:solidFill>
+                      <a:schemeClr val="bg1"/>
+                    </a:solidFill>
+                    <a:latin typeface="Calibri" panose="020F0502020204030204" pitchFamily="34" charset="0"/>
+                    <a:ea typeface="+mn-ea"/>
+                    <a:cs typeface="Calibri" panose="020F0502020204030204" pitchFamily="34" charset="0"/>
+                  </a:defRPr>
+                </a:pPr>
+                <a:endParaRPr lang="en-US"/>
+              </a:p>
+            </c:txPr>
+            <c:dLblPos val="inBase"/>
+            <c:showLegendKey val="0"/>
+            <c:showVal val="1"/>
+            <c:showCatName val="0"/>
+            <c:showSerName val="0"/>
+            <c:showPercent val="0"/>
+            <c:showBubbleSize val="0"/>
+            <c:showLeaderLines val="0"/>
+            <c:extLst>
+              <c:ext xmlns:c15="http://schemas.microsoft.com/office/drawing/2012/chart" uri="{CE6537A1-D6FC-4f65-9D91-7224C49458BB}">
+                <c15:showLeaderLines val="1"/>
+                <c15:leaderLines>
+                  <c:spPr>
+                    <a:ln w="9525" cap="flat" cmpd="sng" algn="ctr">
+                      <a:solidFill>
+                        <a:schemeClr val="tx1">
+                          <a:lumMod val="35000"/>
+                          <a:lumOff val="65000"/>
+                        </a:schemeClr>
+                      </a:solidFill>
+                      <a:round/>
+                    </a:ln>
+                    <a:effectLst/>
+                  </c:spPr>
+                </c15:leaderLines>
+              </c:ext>
+            </c:extLst>
+          </c:dLbls>
+          <c:cat>
+            <c:numRef>
+              <c:f>Sheet1!$A$2:$A$7</c:f>
+              <c:numCache>
+                <c:formatCode>General</c:formatCode>
+                <c:ptCount val="6"/>
+                <c:pt idx="0">
+                  <c:v>2017</c:v>
+                </c:pt>
+                <c:pt idx="1">
+                  <c:v>2018</c:v>
+                </c:pt>
+                <c:pt idx="2">
+                  <c:v>2019</c:v>
+                </c:pt>
+                <c:pt idx="3">
+                  <c:v>2020</c:v>
+                </c:pt>
+                <c:pt idx="4">
+                  <c:v>2021</c:v>
+                </c:pt>
+                <c:pt idx="5">
+                  <c:v>2022</c:v>
+                </c:pt>
+              </c:numCache>
+            </c:numRef>
+          </c:cat>
+          <c:val>
+            <c:numRef>
+              <c:f>Sheet1!$C$2:$C$7</c:f>
+              <c:numCache>
+                <c:formatCode>[$$-409]#,##0.0"M"</c:formatCode>
+                <c:ptCount val="6"/>
+                <c:pt idx="0">
+                  <c:v>0.5</c:v>
+                </c:pt>
+                <c:pt idx="1">
+                  <c:v>0.6</c:v>
+                </c:pt>
+                <c:pt idx="2">
+                  <c:v>0.8</c:v>
+                </c:pt>
+                <c:pt idx="3">
+                  <c:v>1.1000000000000001</c:v>
+                </c:pt>
+                <c:pt idx="4">
+                  <c:v>1.3</c:v>
+                </c:pt>
+                <c:pt idx="5">
+                  <c:v>1.5</c:v>
+                </c:pt>
+              </c:numCache>
+            </c:numRef>
+          </c:val>
+          <c:extLst>
+            <c:ext xmlns:c16="http://schemas.microsoft.com/office/drawing/2014/chart" uri="{C3380CC4-5D6E-409C-BE32-E72D297353CC}">
+              <c16:uniqueId val="{00000001-5605-43E6-8ED8-7F070BC72AB4}"/>
+            </c:ext>
+          </c:extLst>
+        </c:ser>
+        <c:dLbls>
+          <c:dLblPos val="inBase"/>
+          <c:showLegendKey val="0"/>
+          <c:showVal val="1"/>
+          <c:showCatName val="0"/>
+          <c:showSerName val="0"/>
+          <c:showPercent val="0"/>
+          <c:showBubbleSize val="0"/>
+        </c:dLbls>
+        <c:gapWidth val="150"/>
+        <c:overlap val="100"/>
+        <c:axId val="511238368"/>
+        <c:axId val="503646184"/>
+      </c:barChart>
+      <c:catAx>
+        <c:axId val="511238368"/>
+        <c:scaling>
+          <c:orientation val="minMax"/>
+        </c:scaling>
+        <c:delete val="0"/>
+        <c:axPos val="b"/>
+        <c:numFmt formatCode="General" sourceLinked="1"/>
+        <c:majorTickMark val="out"/>
+        <c:minorTickMark val="none"/>
+        <c:tickLblPos val="nextTo"/>
+        <c:spPr>
+          <a:noFill/>
+          <a:ln w="9525" cap="flat" cmpd="sng" algn="ctr">
+            <a:solidFill>
+              <a:schemeClr val="bg1"/>
+            </a:solidFill>
+            <a:round/>
+          </a:ln>
+          <a:effectLst/>
+        </c:spPr>
+        <c:txPr>
+          <a:bodyPr rot="-60000000" spcFirstLastPara="1" vertOverflow="ellipsis" vert="horz" wrap="square" anchor="ctr" anchorCtr="1"/>
+          <a:lstStyle/>
+          <a:p>
+            <a:pPr>
+              <a:defRPr sz="1197" b="1" i="0" u="none" strike="noStrike" kern="1200" baseline="0">
+                <a:solidFill>
+                  <a:schemeClr val="bg1"/>
+                </a:solidFill>
+                <a:latin typeface="Calibri" panose="020F0502020204030204" pitchFamily="34" charset="0"/>
+                <a:ea typeface="+mn-ea"/>
+                <a:cs typeface="Calibri" panose="020F0502020204030204" pitchFamily="34" charset="0"/>
+              </a:defRPr>
+            </a:pPr>
+            <a:endParaRPr lang="en-US"/>
+          </a:p>
+        </c:txPr>
+        <c:crossAx val="503646184"/>
+        <c:crosses val="autoZero"/>
+        <c:auto val="1"/>
+        <c:lblAlgn val="ctr"/>
+        <c:lblOffset val="100"/>
+        <c:noMultiLvlLbl val="0"/>
+      </c:catAx>
+      <c:valAx>
+        <c:axId val="503646184"/>
+        <c:scaling>
+          <c:orientation val="minMax"/>
+        </c:scaling>
+        <c:delete val="1"/>
+        <c:axPos val="l"/>
+        <c:numFmt formatCode="[$$-409]#,##0.0&quot;M&quot;" sourceLinked="1"/>
+        <c:majorTickMark val="none"/>
+        <c:minorTickMark val="none"/>
+        <c:tickLblPos val="nextTo"/>
+        <c:crossAx val="511238368"/>
+        <c:crosses val="autoZero"/>
+        <c:crossBetween val="between"/>
+      </c:valAx>
+      <c:spPr>
+        <a:noFill/>
+        <a:ln>
+          <a:noFill/>
+        </a:ln>
+        <a:effectLst/>
+      </c:spPr>
+    </c:plotArea>
+    <c:legend>
+      <c:legendPos val="b"/>
+      <c:overlay val="0"/>
+      <c:spPr>
+        <a:noFill/>
+        <a:ln>
+          <a:noFill/>
+        </a:ln>
+        <a:effectLst/>
+      </c:spPr>
+      <c:txPr>
+        <a:bodyPr rot="0" spcFirstLastPara="1" vertOverflow="ellipsis" vert="horz" wrap="square" anchor="ctr" anchorCtr="1"/>
+        <a:lstStyle/>
+        <a:p>
+          <a:pPr>
+            <a:defRPr sz="1197" b="1" i="0" u="none" strike="noStrike" kern="1200" baseline="0">
+              <a:solidFill>
+                <a:schemeClr val="bg1"/>
+              </a:solidFill>
+              <a:latin typeface="+mn-lt"/>
+              <a:ea typeface="+mn-ea"/>
+              <a:cs typeface="+mn-cs"/>
+            </a:defRPr>
+          </a:pPr>
+          <a:endParaRPr lang="en-US"/>
+        </a:p>
+      </c:txPr>
+    </c:legend>
+    <c:plotVisOnly val="1"/>
+    <c:dispBlanksAs val="gap"/>
+    <c:extLst>
+      <c:ext xmlns:c16r3="http://schemas.microsoft.com/office/drawing/2017/03/chart" uri="{56B9EC1D-385E-4148-901F-78D8002777C0}">
+        <c16r3:dataDisplayOptions16>
+          <c16r3:dispNaAsBlank val="1"/>
+        </c16r3:dataDisplayOptions16>
+      </c:ext>
+    </c:extLst>
+    <c:showDLblsOverMax val="0"/>
+  </c:chart>
+  <c:spPr>
+    <a:noFill/>
+    <a:ln>
+      <a:noFill/>
+    </a:ln>
+    <a:effectLst/>
+  </c:spPr>
+  <c:txPr>
+    <a:bodyPr/>
+    <a:lstStyle/>
+    <a:p>
+      <a:pPr>
+        <a:defRPr/>
+      </a:pPr>
+      <a:endParaRPr lang="en-US"/>
+    </a:p>
+  </c:txPr>
+  <c:externalData r:id="rId3">
+    <c:autoUpdate val="0"/>
+  </c:externalData>
+</c:chartSpace>
+</file>
+
 <file path=ppt/charts/colors1.xml><?xml version="1.0" encoding="utf-8"?>
 <cs:colorStyle xmlns:cs="http://schemas.microsoft.com/office/drawing/2012/chartStyle" xmlns:a="http://schemas.openxmlformats.org/drawingml/2006/main" meth="withinLinear" id="16">
   <a:schemeClr val="accent3"/>
+</cs:colorStyle>
+</file>
+
+<file path=ppt/charts/colors2.xml><?xml version="1.0" encoding="utf-8"?>
+<cs:colorStyle xmlns:cs="http://schemas.microsoft.com/office/drawing/2012/chartStyle" xmlns:a="http://schemas.openxmlformats.org/drawingml/2006/main" meth="cycle" id="10">
+  <a:schemeClr val="accent1"/>
+  <a:schemeClr val="accent2"/>
+  <a:schemeClr val="accent3"/>
+  <a:schemeClr val="accent4"/>
+  <a:schemeClr val="accent5"/>
+  <a:schemeClr val="accent6"/>
+  <cs:variation/>
+  <cs:variation>
+    <a:lumMod val="60000"/>
+  </cs:variation>
+  <cs:variation>
+    <a:lumMod val="80000"/>
+    <a:lumOff val="20000"/>
+  </cs:variation>
+  <cs:variation>
+    <a:lumMod val="80000"/>
+  </cs:variation>
+  <cs:variation>
+    <a:lumMod val="60000"/>
+    <a:lumOff val="40000"/>
+  </cs:variation>
+  <cs:variation>
+    <a:lumMod val="50000"/>
+  </cs:variation>
+  <cs:variation>
+    <a:lumMod val="70000"/>
+    <a:lumOff val="30000"/>
+  </cs:variation>
+  <cs:variation>
+    <a:lumMod val="70000"/>
+  </cs:variation>
+  <cs:variation>
+    <a:lumMod val="50000"/>
+    <a:lumOff val="50000"/>
+  </cs:variation>
 </cs:colorStyle>
 </file>
 
@@ -3144,6 +3633,974 @@
 </cs:chartStyle>
 </file>
 
+<file path=ppt/charts/style2.xml><?xml version="1.0" encoding="utf-8"?>
+<cs:chartStyle xmlns:cs="http://schemas.microsoft.com/office/drawing/2012/chartStyle" xmlns:a="http://schemas.openxmlformats.org/drawingml/2006/main" id="297">
+  <cs:axisTitle>
+    <cs:lnRef idx="0"/>
+    <cs:fillRef idx="0"/>
+    <cs:effectRef idx="0"/>
+    <cs:fontRef idx="minor">
+      <a:schemeClr val="tx1">
+        <a:lumMod val="65000"/>
+        <a:lumOff val="35000"/>
+      </a:schemeClr>
+    </cs:fontRef>
+    <cs:defRPr sz="1330" kern="1200"/>
+  </cs:axisTitle>
+  <cs:categoryAxis>
+    <cs:lnRef idx="0"/>
+    <cs:fillRef idx="0"/>
+    <cs:effectRef idx="0"/>
+    <cs:fontRef idx="minor">
+      <a:schemeClr val="tx1">
+        <a:lumMod val="65000"/>
+        <a:lumOff val="35000"/>
+      </a:schemeClr>
+    </cs:fontRef>
+    <cs:spPr>
+      <a:ln w="9525" cap="flat" cmpd="sng" algn="ctr">
+        <a:solidFill>
+          <a:schemeClr val="tx1">
+            <a:lumMod val="15000"/>
+            <a:lumOff val="85000"/>
+          </a:schemeClr>
+        </a:solidFill>
+        <a:round/>
+      </a:ln>
+    </cs:spPr>
+    <cs:defRPr sz="1197" kern="1200"/>
+  </cs:categoryAxis>
+  <cs:chartArea mods="allowNoFillOverride allowNoLineOverride">
+    <cs:lnRef idx="0"/>
+    <cs:fillRef idx="0"/>
+    <cs:effectRef idx="0"/>
+    <cs:fontRef idx="minor">
+      <a:schemeClr val="tx1"/>
+    </cs:fontRef>
+    <cs:spPr>
+      <a:solidFill>
+        <a:schemeClr val="bg1"/>
+      </a:solidFill>
+      <a:ln w="9525" cap="flat" cmpd="sng" algn="ctr">
+        <a:solidFill>
+          <a:schemeClr val="tx1">
+            <a:lumMod val="15000"/>
+            <a:lumOff val="85000"/>
+          </a:schemeClr>
+        </a:solidFill>
+        <a:round/>
+      </a:ln>
+    </cs:spPr>
+    <cs:defRPr sz="1330" kern="1200"/>
+  </cs:chartArea>
+  <cs:dataLabel>
+    <cs:lnRef idx="0"/>
+    <cs:fillRef idx="0"/>
+    <cs:effectRef idx="0"/>
+    <cs:fontRef idx="minor">
+      <a:schemeClr val="tx1">
+        <a:lumMod val="75000"/>
+        <a:lumOff val="25000"/>
+      </a:schemeClr>
+    </cs:fontRef>
+    <cs:defRPr sz="1197" kern="1200"/>
+  </cs:dataLabel>
+  <cs:dataLabelCallout>
+    <cs:lnRef idx="0"/>
+    <cs:fillRef idx="0"/>
+    <cs:effectRef idx="0"/>
+    <cs:fontRef idx="minor">
+      <a:schemeClr val="dk1">
+        <a:lumMod val="65000"/>
+        <a:lumOff val="35000"/>
+      </a:schemeClr>
+    </cs:fontRef>
+    <cs:spPr>
+      <a:solidFill>
+        <a:schemeClr val="lt1"/>
+      </a:solidFill>
+      <a:ln>
+        <a:solidFill>
+          <a:schemeClr val="dk1">
+            <a:lumMod val="25000"/>
+            <a:lumOff val="75000"/>
+          </a:schemeClr>
+        </a:solidFill>
+      </a:ln>
+    </cs:spPr>
+    <cs:defRPr sz="1197" kern="1200"/>
+    <cs:bodyPr rot="0" spcFirstLastPara="1" vertOverflow="clip" horzOverflow="clip" vert="horz" wrap="square" lIns="36576" tIns="18288" rIns="36576" bIns="18288" anchor="ctr" anchorCtr="1">
+      <a:spAutoFit/>
+    </cs:bodyPr>
+  </cs:dataLabelCallout>
+  <cs:dataPoint>
+    <cs:lnRef idx="0"/>
+    <cs:fillRef idx="1">
+      <cs:styleClr val="auto"/>
+    </cs:fillRef>
+    <cs:effectRef idx="0"/>
+    <cs:fontRef idx="minor">
+      <a:schemeClr val="tx1"/>
+    </cs:fontRef>
+  </cs:dataPoint>
+  <cs:dataPoint3D>
+    <cs:lnRef idx="0"/>
+    <cs:fillRef idx="1">
+      <cs:styleClr val="auto"/>
+    </cs:fillRef>
+    <cs:effectRef idx="0"/>
+    <cs:fontRef idx="minor">
+      <a:schemeClr val="tx1"/>
+    </cs:fontRef>
+  </cs:dataPoint3D>
+  <cs:dataPointLine>
+    <cs:lnRef idx="0">
+      <cs:styleClr val="auto"/>
+    </cs:lnRef>
+    <cs:fillRef idx="1"/>
+    <cs:effectRef idx="0"/>
+    <cs:fontRef idx="minor">
+      <a:schemeClr val="tx1"/>
+    </cs:fontRef>
+    <cs:spPr>
+      <a:ln w="28575" cap="rnd">
+        <a:solidFill>
+          <a:schemeClr val="phClr"/>
+        </a:solidFill>
+        <a:round/>
+      </a:ln>
+    </cs:spPr>
+  </cs:dataPointLine>
+  <cs:dataPointMarker>
+    <cs:lnRef idx="0">
+      <cs:styleClr val="auto"/>
+    </cs:lnRef>
+    <cs:fillRef idx="1">
+      <cs:styleClr val="auto"/>
+    </cs:fillRef>
+    <cs:effectRef idx="0"/>
+    <cs:fontRef idx="minor">
+      <a:schemeClr val="tx1"/>
+    </cs:fontRef>
+    <cs:spPr>
+      <a:ln w="9525">
+        <a:solidFill>
+          <a:schemeClr val="phClr"/>
+        </a:solidFill>
+      </a:ln>
+    </cs:spPr>
+  </cs:dataPointMarker>
+  <cs:dataPointMarkerLayout symbol="circle" size="5"/>
+  <cs:dataPointWireframe>
+    <cs:lnRef idx="0">
+      <cs:styleClr val="auto"/>
+    </cs:lnRef>
+    <cs:fillRef idx="1"/>
+    <cs:effectRef idx="0"/>
+    <cs:fontRef idx="minor">
+      <a:schemeClr val="tx1"/>
+    </cs:fontRef>
+    <cs:spPr>
+      <a:ln w="9525" cap="rnd">
+        <a:solidFill>
+          <a:schemeClr val="phClr"/>
+        </a:solidFill>
+        <a:round/>
+      </a:ln>
+    </cs:spPr>
+  </cs:dataPointWireframe>
+  <cs:dataTable>
+    <cs:lnRef idx="0"/>
+    <cs:fillRef idx="0"/>
+    <cs:effectRef idx="0"/>
+    <cs:fontRef idx="minor">
+      <a:schemeClr val="tx1">
+        <a:lumMod val="65000"/>
+        <a:lumOff val="35000"/>
+      </a:schemeClr>
+    </cs:fontRef>
+    <cs:spPr>
+      <a:noFill/>
+      <a:ln w="9525" cap="flat" cmpd="sng" algn="ctr">
+        <a:solidFill>
+          <a:schemeClr val="tx1">
+            <a:lumMod val="15000"/>
+            <a:lumOff val="85000"/>
+          </a:schemeClr>
+        </a:solidFill>
+        <a:round/>
+      </a:ln>
+    </cs:spPr>
+    <cs:defRPr sz="1197" kern="1200"/>
+  </cs:dataTable>
+  <cs:downBar>
+    <cs:lnRef idx="0"/>
+    <cs:fillRef idx="0"/>
+    <cs:effectRef idx="0"/>
+    <cs:fontRef idx="minor">
+      <a:schemeClr val="tx1"/>
+    </cs:fontRef>
+    <cs:spPr>
+      <a:solidFill>
+        <a:schemeClr val="dk1">
+          <a:lumMod val="75000"/>
+          <a:lumOff val="25000"/>
+        </a:schemeClr>
+      </a:solidFill>
+      <a:ln w="9525" cap="flat" cmpd="sng" algn="ctr">
+        <a:solidFill>
+          <a:schemeClr val="tx1">
+            <a:lumMod val="65000"/>
+            <a:lumOff val="35000"/>
+          </a:schemeClr>
+        </a:solidFill>
+        <a:round/>
+      </a:ln>
+    </cs:spPr>
+  </cs:downBar>
+  <cs:dropLine>
+    <cs:lnRef idx="0"/>
+    <cs:fillRef idx="0"/>
+    <cs:effectRef idx="0"/>
+    <cs:fontRef idx="minor">
+      <a:schemeClr val="tx1"/>
+    </cs:fontRef>
+    <cs:spPr>
+      <a:ln w="9525" cap="flat" cmpd="sng" algn="ctr">
+        <a:solidFill>
+          <a:schemeClr val="tx1">
+            <a:lumMod val="35000"/>
+            <a:lumOff val="65000"/>
+          </a:schemeClr>
+        </a:solidFill>
+        <a:round/>
+      </a:ln>
+    </cs:spPr>
+  </cs:dropLine>
+  <cs:errorBar>
+    <cs:lnRef idx="0"/>
+    <cs:fillRef idx="0"/>
+    <cs:effectRef idx="0"/>
+    <cs:fontRef idx="minor">
+      <a:schemeClr val="tx1"/>
+    </cs:fontRef>
+    <cs:spPr>
+      <a:ln w="9525" cap="flat" cmpd="sng" algn="ctr">
+        <a:solidFill>
+          <a:schemeClr val="tx1">
+            <a:lumMod val="65000"/>
+            <a:lumOff val="35000"/>
+          </a:schemeClr>
+        </a:solidFill>
+        <a:round/>
+      </a:ln>
+    </cs:spPr>
+  </cs:errorBar>
+  <cs:floor>
+    <cs:lnRef idx="0"/>
+    <cs:fillRef idx="0"/>
+    <cs:effectRef idx="0"/>
+    <cs:fontRef idx="minor">
+      <a:schemeClr val="tx1"/>
+    </cs:fontRef>
+    <cs:spPr>
+      <a:noFill/>
+      <a:ln>
+        <a:noFill/>
+      </a:ln>
+    </cs:spPr>
+  </cs:floor>
+  <cs:gridlineMajor>
+    <cs:lnRef idx="0"/>
+    <cs:fillRef idx="0"/>
+    <cs:effectRef idx="0"/>
+    <cs:fontRef idx="minor">
+      <a:schemeClr val="tx1"/>
+    </cs:fontRef>
+    <cs:spPr>
+      <a:ln w="9525" cap="flat" cmpd="sng" algn="ctr">
+        <a:solidFill>
+          <a:schemeClr val="tx1">
+            <a:lumMod val="15000"/>
+            <a:lumOff val="85000"/>
+          </a:schemeClr>
+        </a:solidFill>
+        <a:round/>
+      </a:ln>
+    </cs:spPr>
+  </cs:gridlineMajor>
+  <cs:gridlineMinor>
+    <cs:lnRef idx="0"/>
+    <cs:fillRef idx="0"/>
+    <cs:effectRef idx="0"/>
+    <cs:fontRef idx="minor">
+      <a:schemeClr val="tx1"/>
+    </cs:fontRef>
+    <cs:spPr>
+      <a:ln w="9525" cap="flat" cmpd="sng" algn="ctr">
+        <a:solidFill>
+          <a:schemeClr val="tx1">
+            <a:lumMod val="5000"/>
+            <a:lumOff val="95000"/>
+          </a:schemeClr>
+        </a:solidFill>
+        <a:round/>
+      </a:ln>
+    </cs:spPr>
+  </cs:gridlineMinor>
+  <cs:hiLoLine>
+    <cs:lnRef idx="0"/>
+    <cs:fillRef idx="0"/>
+    <cs:effectRef idx="0"/>
+    <cs:fontRef idx="minor">
+      <a:schemeClr val="tx1"/>
+    </cs:fontRef>
+    <cs:spPr>
+      <a:ln w="9525" cap="flat" cmpd="sng" algn="ctr">
+        <a:solidFill>
+          <a:schemeClr val="tx1">
+            <a:lumMod val="50000"/>
+            <a:lumOff val="50000"/>
+          </a:schemeClr>
+        </a:solidFill>
+        <a:round/>
+      </a:ln>
+    </cs:spPr>
+  </cs:hiLoLine>
+  <cs:leaderLine>
+    <cs:lnRef idx="0"/>
+    <cs:fillRef idx="0"/>
+    <cs:effectRef idx="0"/>
+    <cs:fontRef idx="minor">
+      <a:schemeClr val="tx1"/>
+    </cs:fontRef>
+    <cs:spPr>
+      <a:ln w="9525" cap="flat" cmpd="sng" algn="ctr">
+        <a:solidFill>
+          <a:schemeClr val="tx1">
+            <a:lumMod val="35000"/>
+            <a:lumOff val="65000"/>
+          </a:schemeClr>
+        </a:solidFill>
+        <a:round/>
+      </a:ln>
+    </cs:spPr>
+  </cs:leaderLine>
+  <cs:legend>
+    <cs:lnRef idx="0"/>
+    <cs:fillRef idx="0"/>
+    <cs:effectRef idx="0"/>
+    <cs:fontRef idx="minor">
+      <a:schemeClr val="tx1">
+        <a:lumMod val="65000"/>
+        <a:lumOff val="35000"/>
+      </a:schemeClr>
+    </cs:fontRef>
+    <cs:defRPr sz="1197" kern="1200"/>
+  </cs:legend>
+  <cs:plotArea mods="allowNoFillOverride allowNoLineOverride">
+    <cs:lnRef idx="0"/>
+    <cs:fillRef idx="0"/>
+    <cs:effectRef idx="0"/>
+    <cs:fontRef idx="minor">
+      <a:schemeClr val="tx1"/>
+    </cs:fontRef>
+  </cs:plotArea>
+  <cs:plotArea3D mods="allowNoFillOverride allowNoLineOverride">
+    <cs:lnRef idx="0"/>
+    <cs:fillRef idx="0"/>
+    <cs:effectRef idx="0"/>
+    <cs:fontRef idx="minor">
+      <a:schemeClr val="tx1"/>
+    </cs:fontRef>
+  </cs:plotArea3D>
+  <cs:seriesAxis>
+    <cs:lnRef idx="0"/>
+    <cs:fillRef idx="0"/>
+    <cs:effectRef idx="0"/>
+    <cs:fontRef idx="minor">
+      <a:schemeClr val="tx1">
+        <a:lumMod val="65000"/>
+        <a:lumOff val="35000"/>
+      </a:schemeClr>
+    </cs:fontRef>
+    <cs:defRPr sz="1197" kern="1200"/>
+  </cs:seriesAxis>
+  <cs:seriesLine>
+    <cs:lnRef idx="0"/>
+    <cs:fillRef idx="0"/>
+    <cs:effectRef idx="0"/>
+    <cs:fontRef idx="minor">
+      <a:schemeClr val="tx1"/>
+    </cs:fontRef>
+    <cs:spPr>
+      <a:ln w="9525" cap="flat" cmpd="sng" algn="ctr">
+        <a:solidFill>
+          <a:schemeClr val="tx1">
+            <a:lumMod val="35000"/>
+            <a:lumOff val="65000"/>
+          </a:schemeClr>
+        </a:solidFill>
+        <a:round/>
+      </a:ln>
+    </cs:spPr>
+  </cs:seriesLine>
+  <cs:title>
+    <cs:lnRef idx="0"/>
+    <cs:fillRef idx="0"/>
+    <cs:effectRef idx="0"/>
+    <cs:fontRef idx="minor">
+      <a:schemeClr val="tx1">
+        <a:lumMod val="65000"/>
+        <a:lumOff val="35000"/>
+      </a:schemeClr>
+    </cs:fontRef>
+    <cs:defRPr sz="1862" b="0" kern="1200" spc="0" baseline="0"/>
+  </cs:title>
+  <cs:trendline>
+    <cs:lnRef idx="0">
+      <cs:styleClr val="auto"/>
+    </cs:lnRef>
+    <cs:fillRef idx="0"/>
+    <cs:effectRef idx="0"/>
+    <cs:fontRef idx="minor">
+      <a:schemeClr val="tx1"/>
+    </cs:fontRef>
+    <cs:spPr>
+      <a:ln w="19050" cap="rnd">
+        <a:solidFill>
+          <a:schemeClr val="phClr"/>
+        </a:solidFill>
+        <a:prstDash val="sysDot"/>
+      </a:ln>
+    </cs:spPr>
+  </cs:trendline>
+  <cs:trendlineLabel>
+    <cs:lnRef idx="0"/>
+    <cs:fillRef idx="0"/>
+    <cs:effectRef idx="0"/>
+    <cs:fontRef idx="minor">
+      <a:schemeClr val="tx1">
+        <a:lumMod val="65000"/>
+        <a:lumOff val="35000"/>
+      </a:schemeClr>
+    </cs:fontRef>
+    <cs:defRPr sz="1197" kern="1200"/>
+  </cs:trendlineLabel>
+  <cs:upBar>
+    <cs:lnRef idx="0"/>
+    <cs:fillRef idx="0"/>
+    <cs:effectRef idx="0"/>
+    <cs:fontRef idx="minor">
+      <a:schemeClr val="tx1"/>
+    </cs:fontRef>
+    <cs:spPr>
+      <a:solidFill>
+        <a:schemeClr val="lt1"/>
+      </a:solidFill>
+      <a:ln w="9525" cap="flat" cmpd="sng" algn="ctr">
+        <a:solidFill>
+          <a:schemeClr val="tx1">
+            <a:lumMod val="65000"/>
+            <a:lumOff val="35000"/>
+          </a:schemeClr>
+        </a:solidFill>
+        <a:round/>
+      </a:ln>
+    </cs:spPr>
+  </cs:upBar>
+  <cs:valueAxis>
+    <cs:lnRef idx="0"/>
+    <cs:fillRef idx="0"/>
+    <cs:effectRef idx="0"/>
+    <cs:fontRef idx="minor">
+      <a:schemeClr val="tx1">
+        <a:lumMod val="65000"/>
+        <a:lumOff val="35000"/>
+      </a:schemeClr>
+    </cs:fontRef>
+    <cs:defRPr sz="1197" kern="1200"/>
+  </cs:valueAxis>
+  <cs:wall>
+    <cs:lnRef idx="0"/>
+    <cs:fillRef idx="0"/>
+    <cs:effectRef idx="0"/>
+    <cs:fontRef idx="minor">
+      <a:schemeClr val="tx1"/>
+    </cs:fontRef>
+    <cs:spPr>
+      <a:noFill/>
+      <a:ln>
+        <a:noFill/>
+      </a:ln>
+    </cs:spPr>
+  </cs:wall>
+</cs:chartStyle>
+</file>
+
+<file path=ppt/notesMasters/notesMaster1.xml><?xml version="1.0" encoding="utf-8"?>
+<p:notesMaster xmlns:a="http://schemas.openxmlformats.org/drawingml/2006/main" xmlns:r="http://schemas.openxmlformats.org/officeDocument/2006/relationships" xmlns:p="http://schemas.openxmlformats.org/presentationml/2006/main">
+  <p:cSld>
+    <p:bg>
+      <p:bgRef idx="1001">
+        <a:schemeClr val="bg1"/>
+      </p:bgRef>
+    </p:bg>
+    <p:spTree>
+      <p:nvGrpSpPr>
+        <p:cNvPr id="1" name=""/>
+        <p:cNvGrpSpPr/>
+        <p:nvPr/>
+      </p:nvGrpSpPr>
+      <p:grpSpPr>
+        <a:xfrm>
+          <a:off x="0" y="0"/>
+          <a:ext cx="0" cy="0"/>
+          <a:chOff x="0" y="0"/>
+          <a:chExt cx="0" cy="0"/>
+        </a:xfrm>
+      </p:grpSpPr>
+      <p:sp>
+        <p:nvSpPr>
+          <p:cNvPr id="2" name="Header Placeholder 1"/>
+          <p:cNvSpPr>
+            <a:spLocks noGrp="1"/>
+          </p:cNvSpPr>
+          <p:nvPr>
+            <p:ph type="hdr" sz="quarter"/>
+          </p:nvPr>
+        </p:nvSpPr>
+        <p:spPr>
+          <a:xfrm>
+            <a:off x="0" y="0"/>
+            <a:ext cx="2971800" cy="458788"/>
+          </a:xfrm>
+          <a:prstGeom prst="rect">
+            <a:avLst/>
+          </a:prstGeom>
+        </p:spPr>
+        <p:txBody>
+          <a:bodyPr vert="horz" lIns="91440" tIns="45720" rIns="91440" bIns="45720" rtlCol="0"/>
+          <a:lstStyle>
+            <a:lvl1pPr algn="l">
+              <a:defRPr sz="1200"/>
+            </a:lvl1pPr>
+          </a:lstStyle>
+          <a:p>
+            <a:endParaRPr lang="en-US"/>
+          </a:p>
+        </p:txBody>
+      </p:sp>
+      <p:sp>
+        <p:nvSpPr>
+          <p:cNvPr id="3" name="Date Placeholder 2"/>
+          <p:cNvSpPr>
+            <a:spLocks noGrp="1"/>
+          </p:cNvSpPr>
+          <p:nvPr>
+            <p:ph type="dt" idx="1"/>
+          </p:nvPr>
+        </p:nvSpPr>
+        <p:spPr>
+          <a:xfrm>
+            <a:off x="3884613" y="0"/>
+            <a:ext cx="2971800" cy="458788"/>
+          </a:xfrm>
+          <a:prstGeom prst="rect">
+            <a:avLst/>
+          </a:prstGeom>
+        </p:spPr>
+        <p:txBody>
+          <a:bodyPr vert="horz" lIns="91440" tIns="45720" rIns="91440" bIns="45720" rtlCol="0"/>
+          <a:lstStyle>
+            <a:lvl1pPr algn="r">
+              <a:defRPr sz="1200"/>
+            </a:lvl1pPr>
+          </a:lstStyle>
+          <a:p>
+            <a:fld id="{FC5160FF-2058-4E2D-AADC-D9A04D1FFE0A}" type="datetimeFigureOut">
+              <a:rPr lang="en-US" smtClean="0"/>
+              <a:t>10/21/2018</a:t>
+            </a:fld>
+            <a:endParaRPr lang="en-US"/>
+          </a:p>
+        </p:txBody>
+      </p:sp>
+      <p:sp>
+        <p:nvSpPr>
+          <p:cNvPr id="4" name="Slide Image Placeholder 3"/>
+          <p:cNvSpPr>
+            <a:spLocks noGrp="1" noRot="1" noChangeAspect="1"/>
+          </p:cNvSpPr>
+          <p:nvPr>
+            <p:ph type="sldImg" idx="2"/>
+          </p:nvPr>
+        </p:nvSpPr>
+        <p:spPr>
+          <a:xfrm>
+            <a:off x="685800" y="1143000"/>
+            <a:ext cx="5486400" cy="3086100"/>
+          </a:xfrm>
+          <a:prstGeom prst="rect">
+            <a:avLst/>
+          </a:prstGeom>
+          <a:noFill/>
+          <a:ln w="12700">
+            <a:solidFill>
+              <a:prstClr val="black"/>
+            </a:solidFill>
+          </a:ln>
+        </p:spPr>
+        <p:txBody>
+          <a:bodyPr vert="horz" lIns="91440" tIns="45720" rIns="91440" bIns="45720" rtlCol="0" anchor="ctr"/>
+          <a:lstStyle/>
+          <a:p>
+            <a:endParaRPr lang="en-US"/>
+          </a:p>
+        </p:txBody>
+      </p:sp>
+      <p:sp>
+        <p:nvSpPr>
+          <p:cNvPr id="5" name="Notes Placeholder 4"/>
+          <p:cNvSpPr>
+            <a:spLocks noGrp="1"/>
+          </p:cNvSpPr>
+          <p:nvPr>
+            <p:ph type="body" sz="quarter" idx="3"/>
+          </p:nvPr>
+        </p:nvSpPr>
+        <p:spPr>
+          <a:xfrm>
+            <a:off x="685800" y="4400550"/>
+            <a:ext cx="5486400" cy="3600450"/>
+          </a:xfrm>
+          <a:prstGeom prst="rect">
+            <a:avLst/>
+          </a:prstGeom>
+        </p:spPr>
+        <p:txBody>
+          <a:bodyPr vert="horz" lIns="91440" tIns="45720" rIns="91440" bIns="45720" rtlCol="0"/>
+          <a:lstStyle/>
+          <a:p>
+            <a:pPr lvl="0"/>
+            <a:r>
+              <a:rPr lang="en-US"/>
+              <a:t>Edit Master text styles</a:t>
+            </a:r>
+          </a:p>
+          <a:p>
+            <a:pPr lvl="1"/>
+            <a:r>
+              <a:rPr lang="en-US"/>
+              <a:t>Second level</a:t>
+            </a:r>
+          </a:p>
+          <a:p>
+            <a:pPr lvl="2"/>
+            <a:r>
+              <a:rPr lang="en-US"/>
+              <a:t>Third level</a:t>
+            </a:r>
+          </a:p>
+          <a:p>
+            <a:pPr lvl="3"/>
+            <a:r>
+              <a:rPr lang="en-US"/>
+              <a:t>Fourth level</a:t>
+            </a:r>
+          </a:p>
+          <a:p>
+            <a:pPr lvl="4"/>
+            <a:r>
+              <a:rPr lang="en-US"/>
+              <a:t>Fifth level</a:t>
+            </a:r>
+          </a:p>
+        </p:txBody>
+      </p:sp>
+      <p:sp>
+        <p:nvSpPr>
+          <p:cNvPr id="6" name="Footer Placeholder 5"/>
+          <p:cNvSpPr>
+            <a:spLocks noGrp="1"/>
+          </p:cNvSpPr>
+          <p:nvPr>
+            <p:ph type="ftr" sz="quarter" idx="4"/>
+          </p:nvPr>
+        </p:nvSpPr>
+        <p:spPr>
+          <a:xfrm>
+            <a:off x="0" y="8685213"/>
+            <a:ext cx="2971800" cy="458787"/>
+          </a:xfrm>
+          <a:prstGeom prst="rect">
+            <a:avLst/>
+          </a:prstGeom>
+        </p:spPr>
+        <p:txBody>
+          <a:bodyPr vert="horz" lIns="91440" tIns="45720" rIns="91440" bIns="45720" rtlCol="0" anchor="b"/>
+          <a:lstStyle>
+            <a:lvl1pPr algn="l">
+              <a:defRPr sz="1200"/>
+            </a:lvl1pPr>
+          </a:lstStyle>
+          <a:p>
+            <a:endParaRPr lang="en-US"/>
+          </a:p>
+        </p:txBody>
+      </p:sp>
+      <p:sp>
+        <p:nvSpPr>
+          <p:cNvPr id="7" name="Slide Number Placeholder 6"/>
+          <p:cNvSpPr>
+            <a:spLocks noGrp="1"/>
+          </p:cNvSpPr>
+          <p:nvPr>
+            <p:ph type="sldNum" sz="quarter" idx="5"/>
+          </p:nvPr>
+        </p:nvSpPr>
+        <p:spPr>
+          <a:xfrm>
+            <a:off x="3884613" y="8685213"/>
+            <a:ext cx="2971800" cy="458787"/>
+          </a:xfrm>
+          <a:prstGeom prst="rect">
+            <a:avLst/>
+          </a:prstGeom>
+        </p:spPr>
+        <p:txBody>
+          <a:bodyPr vert="horz" lIns="91440" tIns="45720" rIns="91440" bIns="45720" rtlCol="0" anchor="b"/>
+          <a:lstStyle>
+            <a:lvl1pPr algn="r">
+              <a:defRPr sz="1200"/>
+            </a:lvl1pPr>
+          </a:lstStyle>
+          <a:p>
+            <a:fld id="{3E64A112-980F-4D35-8711-74DBE1D5C069}" type="slidenum">
+              <a:rPr lang="en-US" smtClean="0"/>
+              <a:t>‹#›</a:t>
+            </a:fld>
+            <a:endParaRPr lang="en-US"/>
+          </a:p>
+        </p:txBody>
+      </p:sp>
+    </p:spTree>
+    <p:extLst>
+      <p:ext uri="{BB962C8B-B14F-4D97-AF65-F5344CB8AC3E}">
+        <p14:creationId xmlns:p14="http://schemas.microsoft.com/office/powerpoint/2010/main" val="865108590"/>
+      </p:ext>
+    </p:extLst>
+  </p:cSld>
+  <p:clrMap bg1="lt1" tx1="dk1" bg2="lt2" tx2="dk2" accent1="accent1" accent2="accent2" accent3="accent3" accent4="accent4" accent5="accent5" accent6="accent6" hlink="hlink" folHlink="folHlink"/>
+  <p:notesStyle>
+    <a:lvl1pPr marL="0" algn="l" defTabSz="914400" rtl="0" eaLnBrk="1" latinLnBrk="0" hangingPunct="1">
+      <a:defRPr sz="1200" kern="1200">
+        <a:solidFill>
+          <a:schemeClr val="tx1"/>
+        </a:solidFill>
+        <a:latin typeface="+mn-lt"/>
+        <a:ea typeface="+mn-ea"/>
+        <a:cs typeface="+mn-cs"/>
+      </a:defRPr>
+    </a:lvl1pPr>
+    <a:lvl2pPr marL="457200" algn="l" defTabSz="914400" rtl="0" eaLnBrk="1" latinLnBrk="0" hangingPunct="1">
+      <a:defRPr sz="1200" kern="1200">
+        <a:solidFill>
+          <a:schemeClr val="tx1"/>
+        </a:solidFill>
+        <a:latin typeface="+mn-lt"/>
+        <a:ea typeface="+mn-ea"/>
+        <a:cs typeface="+mn-cs"/>
+      </a:defRPr>
+    </a:lvl2pPr>
+    <a:lvl3pPr marL="914400" algn="l" defTabSz="914400" rtl="0" eaLnBrk="1" latinLnBrk="0" hangingPunct="1">
+      <a:defRPr sz="1200" kern="1200">
+        <a:solidFill>
+          <a:schemeClr val="tx1"/>
+        </a:solidFill>
+        <a:latin typeface="+mn-lt"/>
+        <a:ea typeface="+mn-ea"/>
+        <a:cs typeface="+mn-cs"/>
+      </a:defRPr>
+    </a:lvl3pPr>
+    <a:lvl4pPr marL="1371600" algn="l" defTabSz="914400" rtl="0" eaLnBrk="1" latinLnBrk="0" hangingPunct="1">
+      <a:defRPr sz="1200" kern="1200">
+        <a:solidFill>
+          <a:schemeClr val="tx1"/>
+        </a:solidFill>
+        <a:latin typeface="+mn-lt"/>
+        <a:ea typeface="+mn-ea"/>
+        <a:cs typeface="+mn-cs"/>
+      </a:defRPr>
+    </a:lvl4pPr>
+    <a:lvl5pPr marL="1828800" algn="l" defTabSz="914400" rtl="0" eaLnBrk="1" latinLnBrk="0" hangingPunct="1">
+      <a:defRPr sz="1200" kern="1200">
+        <a:solidFill>
+          <a:schemeClr val="tx1"/>
+        </a:solidFill>
+        <a:latin typeface="+mn-lt"/>
+        <a:ea typeface="+mn-ea"/>
+        <a:cs typeface="+mn-cs"/>
+      </a:defRPr>
+    </a:lvl5pPr>
+    <a:lvl6pPr marL="2286000" algn="l" defTabSz="914400" rtl="0" eaLnBrk="1" latinLnBrk="0" hangingPunct="1">
+      <a:defRPr sz="1200" kern="1200">
+        <a:solidFill>
+          <a:schemeClr val="tx1"/>
+        </a:solidFill>
+        <a:latin typeface="+mn-lt"/>
+        <a:ea typeface="+mn-ea"/>
+        <a:cs typeface="+mn-cs"/>
+      </a:defRPr>
+    </a:lvl6pPr>
+    <a:lvl7pPr marL="2743200" algn="l" defTabSz="914400" rtl="0" eaLnBrk="1" latinLnBrk="0" hangingPunct="1">
+      <a:defRPr sz="1200" kern="1200">
+        <a:solidFill>
+          <a:schemeClr val="tx1"/>
+        </a:solidFill>
+        <a:latin typeface="+mn-lt"/>
+        <a:ea typeface="+mn-ea"/>
+        <a:cs typeface="+mn-cs"/>
+      </a:defRPr>
+    </a:lvl7pPr>
+    <a:lvl8pPr marL="3200400" algn="l" defTabSz="914400" rtl="0" eaLnBrk="1" latinLnBrk="0" hangingPunct="1">
+      <a:defRPr sz="1200" kern="1200">
+        <a:solidFill>
+          <a:schemeClr val="tx1"/>
+        </a:solidFill>
+        <a:latin typeface="+mn-lt"/>
+        <a:ea typeface="+mn-ea"/>
+        <a:cs typeface="+mn-cs"/>
+      </a:defRPr>
+    </a:lvl8pPr>
+    <a:lvl9pPr marL="3657600" algn="l" defTabSz="914400" rtl="0" eaLnBrk="1" latinLnBrk="0" hangingPunct="1">
+      <a:defRPr sz="1200" kern="1200">
+        <a:solidFill>
+          <a:schemeClr val="tx1"/>
+        </a:solidFill>
+        <a:latin typeface="+mn-lt"/>
+        <a:ea typeface="+mn-ea"/>
+        <a:cs typeface="+mn-cs"/>
+      </a:defRPr>
+    </a:lvl9pPr>
+  </p:notesStyle>
+</p:notesMaster>
+</file>
+
+<file path=ppt/notesSlides/notesSlide1.xml><?xml version="1.0" encoding="utf-8"?>
+<p:notes xmlns:a="http://schemas.openxmlformats.org/drawingml/2006/main" xmlns:r="http://schemas.openxmlformats.org/officeDocument/2006/relationships" xmlns:p="http://schemas.openxmlformats.org/presentationml/2006/main">
+  <p:cSld>
+    <p:spTree>
+      <p:nvGrpSpPr>
+        <p:cNvPr id="1" name=""/>
+        <p:cNvGrpSpPr/>
+        <p:nvPr/>
+      </p:nvGrpSpPr>
+      <p:grpSpPr>
+        <a:xfrm>
+          <a:off x="0" y="0"/>
+          <a:ext cx="0" cy="0"/>
+          <a:chOff x="0" y="0"/>
+          <a:chExt cx="0" cy="0"/>
+        </a:xfrm>
+      </p:grpSpPr>
+      <p:sp>
+        <p:nvSpPr>
+          <p:cNvPr id="2" name="Slide Image Placeholder 1"/>
+          <p:cNvSpPr>
+            <a:spLocks noGrp="1" noRot="1" noChangeAspect="1"/>
+          </p:cNvSpPr>
+          <p:nvPr>
+            <p:ph type="sldImg"/>
+          </p:nvPr>
+        </p:nvSpPr>
+        <p:spPr/>
+      </p:sp>
+      <p:sp>
+        <p:nvSpPr>
+          <p:cNvPr id="3" name="Notes Placeholder 2"/>
+          <p:cNvSpPr>
+            <a:spLocks noGrp="1"/>
+          </p:cNvSpPr>
+          <p:nvPr>
+            <p:ph type="body" idx="1"/>
+          </p:nvPr>
+        </p:nvSpPr>
+        <p:spPr/>
+        <p:txBody>
+          <a:bodyPr/>
+          <a:lstStyle/>
+          <a:p>
+            <a:r>
+              <a:rPr lang="de-DE" dirty="0">
+                <a:solidFill>
+                  <a:schemeClr val="bg1"/>
+                </a:solidFill>
+                <a:latin typeface="Calibri" panose="020F0502020204030204" pitchFamily="34" charset="0"/>
+                <a:cs typeface="Calibri" panose="020F0502020204030204" pitchFamily="34" charset="0"/>
+              </a:rPr>
+              <a:t>CAGR: </a:t>
+            </a:r>
+            <a:r>
+              <a:rPr lang="de-DE" dirty="0" err="1">
+                <a:solidFill>
+                  <a:schemeClr val="bg1"/>
+                </a:solidFill>
+                <a:latin typeface="Calibri" panose="020F0502020204030204" pitchFamily="34" charset="0"/>
+                <a:cs typeface="Calibri" panose="020F0502020204030204" pitchFamily="34" charset="0"/>
+              </a:rPr>
+              <a:t>Compound</a:t>
+            </a:r>
+            <a:r>
+              <a:rPr lang="de-DE" dirty="0">
+                <a:solidFill>
+                  <a:schemeClr val="bg1"/>
+                </a:solidFill>
+                <a:latin typeface="Calibri" panose="020F0502020204030204" pitchFamily="34" charset="0"/>
+                <a:cs typeface="Calibri" panose="020F0502020204030204" pitchFamily="34" charset="0"/>
+              </a:rPr>
+              <a:t> Annual Growth Rate</a:t>
+            </a:r>
+            <a:endParaRPr lang="en-US" dirty="0"/>
+          </a:p>
+        </p:txBody>
+      </p:sp>
+      <p:sp>
+        <p:nvSpPr>
+          <p:cNvPr id="4" name="Slide Number Placeholder 3"/>
+          <p:cNvSpPr>
+            <a:spLocks noGrp="1"/>
+          </p:cNvSpPr>
+          <p:nvPr>
+            <p:ph type="sldNum" sz="quarter" idx="10"/>
+          </p:nvPr>
+        </p:nvSpPr>
+        <p:spPr/>
+        <p:txBody>
+          <a:bodyPr/>
+          <a:lstStyle/>
+          <a:p>
+            <a:fld id="{3E64A112-980F-4D35-8711-74DBE1D5C069}" type="slidenum">
+              <a:rPr lang="en-US" smtClean="0"/>
+              <a:t>3</a:t>
+            </a:fld>
+            <a:endParaRPr lang="en-US"/>
+          </a:p>
+        </p:txBody>
+      </p:sp>
+    </p:spTree>
+    <p:extLst>
+      <p:ext uri="{BB962C8B-B14F-4D97-AF65-F5344CB8AC3E}">
+        <p14:creationId xmlns:p14="http://schemas.microsoft.com/office/powerpoint/2010/main" val="1981834380"/>
+      </p:ext>
+    </p:extLst>
+  </p:cSld>
+  <p:clrMapOvr>
+    <a:masterClrMapping/>
+  </p:clrMapOvr>
+</p:notes>
+</file>
+
 <file path=ppt/slideLayouts/slideLayout1.xml><?xml version="1.0" encoding="utf-8"?>
 <p:sldLayout xmlns:a="http://schemas.openxmlformats.org/drawingml/2006/main" xmlns:r="http://schemas.openxmlformats.org/officeDocument/2006/relationships" xmlns:p="http://schemas.openxmlformats.org/presentationml/2006/main" showMasterSp="0" type="title" preserve="1">
   <p:cSld name="Title Slide">
@@ -6703,7 +8160,7 @@
         </p:xfrm>
         <a:graphic>
           <a:graphicData uri="http://schemas.openxmlformats.org/drawingml/2006/chart">
-            <c:chart xmlns:c="http://schemas.openxmlformats.org/drawingml/2006/chart" xmlns:r="http://schemas.openxmlformats.org/officeDocument/2006/relationships" r:id="rId2"/>
+            <c:chart xmlns:c="http://schemas.openxmlformats.org/drawingml/2006/chart" xmlns:r="http://schemas.openxmlformats.org/officeDocument/2006/relationships" r:id="rId3"/>
           </a:graphicData>
         </a:graphic>
       </p:graphicFrame>
@@ -6762,8 +8219,8 @@
         </p:nvSpPr>
         <p:spPr>
           <a:xfrm>
-            <a:off x="93669" y="2873787"/>
-            <a:ext cx="5072028" cy="369332"/>
+            <a:off x="151021" y="2881582"/>
+            <a:ext cx="4964714" cy="338554"/>
           </a:xfrm>
           <a:prstGeom prst="rect">
             <a:avLst/>
@@ -6778,8 +8235,8 @@
           <a:p>
             <a:pPr algn="ctr"/>
             <a:r>
-              <a:rPr lang="en-US" b="1" dirty="0"/>
-              <a:t>eHealth market size in European Countries 2018</a:t>
+              <a:rPr lang="en-US" sz="1600" b="1" dirty="0"/>
+              <a:t>eHealth market size in European Countries 2018 (USD)</a:t>
             </a:r>
           </a:p>
         </p:txBody>
@@ -6798,8 +8255,8 @@
         </p:nvSpPr>
         <p:spPr>
           <a:xfrm>
-            <a:off x="1488285" y="6487217"/>
-            <a:ext cx="1641411" cy="276999"/>
+            <a:off x="1476615" y="6487217"/>
+            <a:ext cx="1664751" cy="276999"/>
           </a:xfrm>
           <a:prstGeom prst="rect">
             <a:avLst/>
@@ -6830,9 +8287,9 @@
                 </a:solidFill>
                 <a:latin typeface="Calibri" panose="020F0502020204030204" pitchFamily="34" charset="0"/>
                 <a:cs typeface="Calibri" panose="020F0502020204030204" pitchFamily="34" charset="0"/>
-                <a:hlinkClick r:id="rId3"/>
+                <a:hlinkClick r:id="rId4"/>
               </a:rPr>
-              <a:t>Statista (2018)</a:t>
+              <a:t>Statista (2018a)</a:t>
             </a:r>
             <a:endParaRPr lang="en-US" sz="1200" dirty="0">
               <a:solidFill>
@@ -6916,8 +8373,8 @@
         </p:nvSpPr>
         <p:spPr>
           <a:xfrm>
-            <a:off x="156249" y="1924268"/>
-            <a:ext cx="11939487" cy="1295868"/>
+            <a:off x="158844" y="1831015"/>
+            <a:ext cx="11650946" cy="880369"/>
           </a:xfrm>
           <a:prstGeom prst="rect">
             <a:avLst/>
@@ -6953,34 +8410,282 @@
             </a:r>
           </a:p>
           <a:p>
-            <a:pPr marL="742950" lvl="1" indent="-285750">
+            <a:pPr>
               <a:lnSpc>
                 <a:spcPct val="150000"/>
               </a:lnSpc>
-              <a:buFont typeface="Arial" panose="020B0604020202020204" pitchFamily="34" charset="0"/>
-              <a:buChar char="•"/>
             </a:pPr>
+            <a:r>
+              <a:rPr lang="en-US" b="1" dirty="0">
+                <a:solidFill>
+                  <a:schemeClr val="bg1"/>
+                </a:solidFill>
+              </a:rPr>
+              <a:t>Heart failure </a:t>
+            </a:r>
             <a:r>
               <a:rPr lang="en-US" dirty="0">
                 <a:solidFill>
                   <a:schemeClr val="bg1"/>
                 </a:solidFill>
               </a:rPr>
-              <a:t>This includes healthcare services and processes, prevention, health surveillance, treatment, among other fields.</a:t>
-            </a:r>
-          </a:p>
-          <a:p>
-            <a:pPr marL="285750" indent="-285750">
-              <a:lnSpc>
-                <a:spcPct val="150000"/>
-              </a:lnSpc>
-              <a:buFont typeface="Arial" panose="020B0604020202020204" pitchFamily="34" charset="0"/>
-              <a:buChar char="•"/>
-            </a:pPr>
+              <a:t>is one of the most relevant eHealth areas, as it is </a:t>
+            </a:r>
+            <a:r>
+              <a:rPr lang="en-US" b="1" dirty="0">
+                <a:solidFill>
+                  <a:schemeClr val="bg1"/>
+                </a:solidFill>
+              </a:rPr>
+              <a:t>by far the most frequent cause of death</a:t>
+            </a:r>
+            <a:r>
+              <a:rPr lang="en-US" dirty="0">
+                <a:solidFill>
+                  <a:schemeClr val="bg1"/>
+                </a:solidFill>
+              </a:rPr>
+              <a:t> </a:t>
+            </a:r>
+            <a:r>
+              <a:rPr lang="en-US" b="1" dirty="0">
+                <a:solidFill>
+                  <a:schemeClr val="bg1"/>
+                </a:solidFill>
+              </a:rPr>
+              <a:t>in Germany.</a:t>
+            </a:r>
+          </a:p>
+        </p:txBody>
+      </p:sp>
+      <p:sp>
+        <p:nvSpPr>
+          <p:cNvPr id="17" name="TextBox 16">
+            <a:extLst>
+              <a:ext uri="{FF2B5EF4-FFF2-40B4-BE49-F238E27FC236}">
+                <a16:creationId xmlns:a16="http://schemas.microsoft.com/office/drawing/2014/main" id="{EA783067-A5CD-457B-9DF2-FB619E559E0B}"/>
+              </a:ext>
+            </a:extLst>
+          </p:cNvPr>
+          <p:cNvSpPr txBox="1"/>
+          <p:nvPr/>
+        </p:nvSpPr>
+        <p:spPr>
+          <a:xfrm>
+            <a:off x="5342260" y="2892973"/>
+            <a:ext cx="6849740" cy="338554"/>
+          </a:xfrm>
+          <a:prstGeom prst="rect">
+            <a:avLst/>
+          </a:prstGeom>
+          <a:noFill/>
+        </p:spPr>
+        <p:txBody>
+          <a:bodyPr wrap="square" rtlCol="0">
+            <a:spAutoFit/>
+          </a:bodyPr>
+          <a:lstStyle/>
+          <a:p>
+            <a:pPr algn="ctr"/>
+            <a:r>
+              <a:rPr lang="en-US" sz="1600" b="1" dirty="0"/>
+              <a:t>Market size for eHealth solutions for heart failure in Germany (USD)</a:t>
+            </a:r>
+          </a:p>
+        </p:txBody>
+      </p:sp>
+      <p:graphicFrame>
+        <p:nvGraphicFramePr>
+          <p:cNvPr id="20" name="Chart 19">
+            <a:extLst>
+              <a:ext uri="{FF2B5EF4-FFF2-40B4-BE49-F238E27FC236}">
+                <a16:creationId xmlns:a16="http://schemas.microsoft.com/office/drawing/2014/main" id="{A5A3FFAF-8866-4A45-8C47-2CB8ACA9734A}"/>
+              </a:ext>
+            </a:extLst>
+          </p:cNvPr>
+          <p:cNvGraphicFramePr/>
+          <p:nvPr>
+            <p:extLst>
+              <p:ext uri="{D42A27DB-BD31-4B8C-83A1-F6EECF244321}">
+                <p14:modId xmlns:p14="http://schemas.microsoft.com/office/powerpoint/2010/main" val="1116954956"/>
+              </p:ext>
+            </p:extLst>
+          </p:nvPr>
+        </p:nvGraphicFramePr>
+        <p:xfrm>
+          <a:off x="5633545" y="3231528"/>
+          <a:ext cx="6096912" cy="3179000"/>
+        </p:xfrm>
+        <a:graphic>
+          <a:graphicData uri="http://schemas.openxmlformats.org/drawingml/2006/chart">
+            <c:chart xmlns:c="http://schemas.openxmlformats.org/drawingml/2006/chart" xmlns:r="http://schemas.openxmlformats.org/officeDocument/2006/relationships" r:id="rId5"/>
+          </a:graphicData>
+        </a:graphic>
+      </p:graphicFrame>
+      <p:cxnSp>
+        <p:nvCxnSpPr>
+          <p:cNvPr id="23" name="Straight Arrow Connector 22">
+            <a:extLst>
+              <a:ext uri="{FF2B5EF4-FFF2-40B4-BE49-F238E27FC236}">
+                <a16:creationId xmlns:a16="http://schemas.microsoft.com/office/drawing/2014/main" id="{4BE5F5FC-B089-4FF8-A5A8-1369A99751BD}"/>
+              </a:ext>
+            </a:extLst>
+          </p:cNvPr>
+          <p:cNvCxnSpPr/>
+          <p:nvPr/>
+        </p:nvCxnSpPr>
+        <p:spPr>
+          <a:xfrm flipV="1">
+            <a:off x="6190593" y="3378179"/>
+            <a:ext cx="4897821" cy="536027"/>
+          </a:xfrm>
+          <a:prstGeom prst="straightConnector1">
+            <a:avLst/>
+          </a:prstGeom>
+          <a:ln w="28575">
+            <a:solidFill>
+              <a:schemeClr val="tx2"/>
+            </a:solidFill>
+            <a:tailEnd type="triangle"/>
+          </a:ln>
+        </p:spPr>
+        <p:style>
+          <a:lnRef idx="1">
+            <a:schemeClr val="accent1"/>
+          </a:lnRef>
+          <a:fillRef idx="0">
+            <a:schemeClr val="accent1"/>
+          </a:fillRef>
+          <a:effectRef idx="0">
+            <a:schemeClr val="accent1"/>
+          </a:effectRef>
+          <a:fontRef idx="minor">
+            <a:schemeClr val="tx1"/>
+          </a:fontRef>
+        </p:style>
+      </p:cxnSp>
+      <p:sp>
+        <p:nvSpPr>
+          <p:cNvPr id="24" name="Rectangle 23">
+            <a:extLst>
+              <a:ext uri="{FF2B5EF4-FFF2-40B4-BE49-F238E27FC236}">
+                <a16:creationId xmlns:a16="http://schemas.microsoft.com/office/drawing/2014/main" id="{06587FDF-0235-44CB-BEA9-EE5919B7D99B}"/>
+              </a:ext>
+            </a:extLst>
+          </p:cNvPr>
+          <p:cNvSpPr/>
+          <p:nvPr/>
+        </p:nvSpPr>
+        <p:spPr>
+          <a:xfrm rot="21203257">
+            <a:off x="7930337" y="3383150"/>
+            <a:ext cx="1306838" cy="274252"/>
+          </a:xfrm>
+          <a:prstGeom prst="rect">
+            <a:avLst/>
+          </a:prstGeom>
+          <a:noFill/>
+          <a:ln>
+            <a:noFill/>
+          </a:ln>
+        </p:spPr>
+        <p:style>
+          <a:lnRef idx="2">
+            <a:schemeClr val="accent1">
+              <a:shade val="50000"/>
+            </a:schemeClr>
+          </a:lnRef>
+          <a:fillRef idx="1">
+            <a:schemeClr val="accent1"/>
+          </a:fillRef>
+          <a:effectRef idx="0">
+            <a:schemeClr val="accent1"/>
+          </a:effectRef>
+          <a:fontRef idx="minor">
+            <a:schemeClr val="lt1"/>
+          </a:fontRef>
+        </p:style>
+        <p:txBody>
+          <a:bodyPr rtlCol="0" anchor="ctr"/>
+          <a:lstStyle/>
+          <a:p>
+            <a:pPr algn="ctr"/>
+            <a:r>
+              <a:rPr lang="de-DE" dirty="0">
+                <a:solidFill>
+                  <a:schemeClr val="bg1"/>
+                </a:solidFill>
+                <a:latin typeface="Calibri" panose="020F0502020204030204" pitchFamily="34" charset="0"/>
+                <a:cs typeface="Calibri" panose="020F0502020204030204" pitchFamily="34" charset="0"/>
+              </a:rPr>
+              <a:t>7% CAGR</a:t>
+            </a:r>
             <a:endParaRPr lang="en-US" dirty="0">
               <a:solidFill>
                 <a:schemeClr val="bg1"/>
               </a:solidFill>
+              <a:latin typeface="Calibri" panose="020F0502020204030204" pitchFamily="34" charset="0"/>
+              <a:cs typeface="Calibri" panose="020F0502020204030204" pitchFamily="34" charset="0"/>
+            </a:endParaRPr>
+          </a:p>
+        </p:txBody>
+      </p:sp>
+      <p:sp>
+        <p:nvSpPr>
+          <p:cNvPr id="25" name="TextBox 24">
+            <a:extLst>
+              <a:ext uri="{FF2B5EF4-FFF2-40B4-BE49-F238E27FC236}">
+                <a16:creationId xmlns:a16="http://schemas.microsoft.com/office/drawing/2014/main" id="{773653D8-3643-497A-8363-B91A3C178231}"/>
+              </a:ext>
+            </a:extLst>
+          </p:cNvPr>
+          <p:cNvSpPr txBox="1"/>
+          <p:nvPr/>
+        </p:nvSpPr>
+        <p:spPr>
+          <a:xfrm>
+            <a:off x="7749661" y="6487216"/>
+            <a:ext cx="1671163" cy="276999"/>
+          </a:xfrm>
+          <a:prstGeom prst="rect">
+            <a:avLst/>
+          </a:prstGeom>
+          <a:noFill/>
+        </p:spPr>
+        <p:txBody>
+          <a:bodyPr wrap="none" rtlCol="0">
+            <a:spAutoFit/>
+          </a:bodyPr>
+          <a:lstStyle/>
+          <a:p>
+            <a:pPr algn="ctr"/>
+            <a:r>
+              <a:rPr lang="de-DE" sz="1200" dirty="0">
+                <a:solidFill>
+                  <a:schemeClr val="bg1"/>
+                </a:solidFill>
+                <a:latin typeface="Calibri" panose="020F0502020204030204" pitchFamily="34" charset="0"/>
+                <a:cs typeface="Calibri" panose="020F0502020204030204" pitchFamily="34" charset="0"/>
+              </a:rPr>
+              <a:t>Source: </a:t>
+            </a:r>
+            <a:r>
+              <a:rPr lang="de-DE" sz="1200" dirty="0">
+                <a:solidFill>
+                  <a:schemeClr val="bg1"/>
+                </a:solidFill>
+                <a:latin typeface="Calibri" panose="020F0502020204030204" pitchFamily="34" charset="0"/>
+                <a:cs typeface="Calibri" panose="020F0502020204030204" pitchFamily="34" charset="0"/>
+                <a:hlinkClick r:id="rId6"/>
+              </a:rPr>
+              <a:t>Statista (2018b)</a:t>
+            </a:r>
+            <a:endParaRPr lang="en-US" sz="1200" dirty="0">
+              <a:solidFill>
+                <a:schemeClr val="bg1"/>
+              </a:solidFill>
+              <a:latin typeface="Calibri" panose="020F0502020204030204" pitchFamily="34" charset="0"/>
+              <a:cs typeface="Calibri" panose="020F0502020204030204" pitchFamily="34" charset="0"/>
             </a:endParaRPr>
           </a:p>
         </p:txBody>
@@ -7064,7 +8769,43 @@
           <a:bodyPr/>
           <a:lstStyle/>
           <a:p>
-            <a:endParaRPr lang="en-US"/>
+            <a:r>
+              <a:rPr lang="en-US" dirty="0">
+                <a:hlinkClick r:id="rId2"/>
+              </a:rPr>
+              <a:t>https://ecgod.co.uk/</a:t>
+            </a:r>
+            <a:endParaRPr lang="en-US" dirty="0"/>
+          </a:p>
+          <a:p>
+            <a:r>
+              <a:rPr lang="en-US" dirty="0">
+                <a:hlinkClick r:id="rId3"/>
+              </a:rPr>
+              <a:t>https://precisecloud.online/</a:t>
+            </a:r>
+            <a:endParaRPr lang="en-US" dirty="0"/>
+          </a:p>
+          <a:p>
+            <a:r>
+              <a:rPr lang="en-US" dirty="0">
+                <a:hlinkClick r:id="rId4"/>
+              </a:rPr>
+              <a:t>https://theheartbit.com/</a:t>
+            </a:r>
+            <a:endParaRPr lang="en-US" dirty="0"/>
+          </a:p>
+          <a:p>
+            <a:r>
+              <a:rPr lang="en-US" dirty="0">
+                <a:hlinkClick r:id="rId5"/>
+              </a:rPr>
+              <a:t>https://www.alivecor.com/</a:t>
+            </a:r>
+            <a:endParaRPr lang="en-US" dirty="0"/>
+          </a:p>
+          <a:p>
+            <a:endParaRPr lang="en-US" dirty="0"/>
           </a:p>
         </p:txBody>
       </p:sp>
@@ -7341,4 +9082,299 @@
     </a:ext>
   </a:extLst>
 </a:theme>
+</file>
+
+<file path=ppt/theme/theme2.xml><?xml version="1.0" encoding="utf-8"?>
+<a:theme xmlns:a="http://schemas.openxmlformats.org/drawingml/2006/main" name="Office Theme">
+  <a:themeElements>
+    <a:clrScheme name="Office">
+      <a:dk1>
+        <a:sysClr val="windowText" lastClr="000000"/>
+      </a:dk1>
+      <a:lt1>
+        <a:sysClr val="window" lastClr="FFFFFF"/>
+      </a:lt1>
+      <a:dk2>
+        <a:srgbClr val="44546A"/>
+      </a:dk2>
+      <a:lt2>
+        <a:srgbClr val="E7E6E6"/>
+      </a:lt2>
+      <a:accent1>
+        <a:srgbClr val="4472C4"/>
+      </a:accent1>
+      <a:accent2>
+        <a:srgbClr val="ED7D31"/>
+      </a:accent2>
+      <a:accent3>
+        <a:srgbClr val="A5A5A5"/>
+      </a:accent3>
+      <a:accent4>
+        <a:srgbClr val="FFC000"/>
+      </a:accent4>
+      <a:accent5>
+        <a:srgbClr val="5B9BD5"/>
+      </a:accent5>
+      <a:accent6>
+        <a:srgbClr val="70AD47"/>
+      </a:accent6>
+      <a:hlink>
+        <a:srgbClr val="0563C1"/>
+      </a:hlink>
+      <a:folHlink>
+        <a:srgbClr val="954F72"/>
+      </a:folHlink>
+    </a:clrScheme>
+    <a:fontScheme name="Office">
+      <a:majorFont>
+        <a:latin typeface="Calibri Light" panose="020F0302020204030204"/>
+        <a:ea typeface=""/>
+        <a:cs typeface=""/>
+        <a:font script="Jpan" typeface="游ゴシック Light"/>
+        <a:font script="Hang" typeface="맑은 고딕"/>
+        <a:font script="Hans" typeface="等线 Light"/>
+        <a:font script="Hant" typeface="新細明體"/>
+        <a:font script="Arab" typeface="Times New Roman"/>
+        <a:font script="Hebr" typeface="Times New Roman"/>
+        <a:font script="Thai" typeface="Angsana New"/>
+        <a:font script="Ethi" typeface="Nyala"/>
+        <a:font script="Beng" typeface="Vrinda"/>
+        <a:font script="Gujr" typeface="Shruti"/>
+        <a:font script="Khmr" typeface="MoolBoran"/>
+        <a:font script="Knda" typeface="Tunga"/>
+        <a:font script="Guru" typeface="Raavi"/>
+        <a:font script="Cans" typeface="Euphemia"/>
+        <a:font script="Cher" typeface="Plantagenet Cherokee"/>
+        <a:font script="Yiii" typeface="Microsoft Yi Baiti"/>
+        <a:font script="Tibt" typeface="Microsoft Himalaya"/>
+        <a:font script="Thaa" typeface="MV Boli"/>
+        <a:font script="Deva" typeface="Mangal"/>
+        <a:font script="Telu" typeface="Gautami"/>
+        <a:font script="Taml" typeface="Latha"/>
+        <a:font script="Syrc" typeface="Estrangelo Edessa"/>
+        <a:font script="Orya" typeface="Kalinga"/>
+        <a:font script="Mlym" typeface="Kartika"/>
+        <a:font script="Laoo" typeface="DokChampa"/>
+        <a:font script="Sinh" typeface="Iskoola Pota"/>
+        <a:font script="Mong" typeface="Mongolian Baiti"/>
+        <a:font script="Viet" typeface="Times New Roman"/>
+        <a:font script="Uigh" typeface="Microsoft Uighur"/>
+        <a:font script="Geor" typeface="Sylfaen"/>
+        <a:font script="Armn" typeface="Arial"/>
+        <a:font script="Bugi" typeface="Leelawadee UI"/>
+        <a:font script="Bopo" typeface="Microsoft JhengHei"/>
+        <a:font script="Java" typeface="Javanese Text"/>
+        <a:font script="Lisu" typeface="Segoe UI"/>
+        <a:font script="Mymr" typeface="Myanmar Text"/>
+        <a:font script="Nkoo" typeface="Ebrima"/>
+        <a:font script="Olck" typeface="Nirmala UI"/>
+        <a:font script="Osma" typeface="Ebrima"/>
+        <a:font script="Phag" typeface="Phagspa"/>
+        <a:font script="Syrn" typeface="Estrangelo Edessa"/>
+        <a:font script="Syrj" typeface="Estrangelo Edessa"/>
+        <a:font script="Syre" typeface="Estrangelo Edessa"/>
+        <a:font script="Sora" typeface="Nirmala UI"/>
+        <a:font script="Tale" typeface="Microsoft Tai Le"/>
+        <a:font script="Talu" typeface="Microsoft New Tai Lue"/>
+        <a:font script="Tfng" typeface="Ebrima"/>
+      </a:majorFont>
+      <a:minorFont>
+        <a:latin typeface="Calibri" panose="020F0502020204030204"/>
+        <a:ea typeface=""/>
+        <a:cs typeface=""/>
+        <a:font script="Jpan" typeface="游ゴシック"/>
+        <a:font script="Hang" typeface="맑은 고딕"/>
+        <a:font script="Hans" typeface="等线"/>
+        <a:font script="Hant" typeface="新細明體"/>
+        <a:font script="Arab" typeface="Arial"/>
+        <a:font script="Hebr" typeface="Arial"/>
+        <a:font script="Thai" typeface="Cordia New"/>
+        <a:font script="Ethi" typeface="Nyala"/>
+        <a:font script="Beng" typeface="Vrinda"/>
+        <a:font script="Gujr" typeface="Shruti"/>
+        <a:font script="Khmr" typeface="DaunPenh"/>
+        <a:font script="Knda" typeface="Tunga"/>
+        <a:font script="Guru" typeface="Raavi"/>
+        <a:font script="Cans" typeface="Euphemia"/>
+        <a:font script="Cher" typeface="Plantagenet Cherokee"/>
+        <a:font script="Yiii" typeface="Microsoft Yi Baiti"/>
+        <a:font script="Tibt" typeface="Microsoft Himalaya"/>
+        <a:font script="Thaa" typeface="MV Boli"/>
+        <a:font script="Deva" typeface="Mangal"/>
+        <a:font script="Telu" typeface="Gautami"/>
+        <a:font script="Taml" typeface="Latha"/>
+        <a:font script="Syrc" typeface="Estrangelo Edessa"/>
+        <a:font script="Orya" typeface="Kalinga"/>
+        <a:font script="Mlym" typeface="Kartika"/>
+        <a:font script="Laoo" typeface="DokChampa"/>
+        <a:font script="Sinh" typeface="Iskoola Pota"/>
+        <a:font script="Mong" typeface="Mongolian Baiti"/>
+        <a:font script="Viet" typeface="Arial"/>
+        <a:font script="Uigh" typeface="Microsoft Uighur"/>
+        <a:font script="Geor" typeface="Sylfaen"/>
+        <a:font script="Armn" typeface="Arial"/>
+        <a:font script="Bugi" typeface="Leelawadee UI"/>
+        <a:font script="Bopo" typeface="Microsoft JhengHei"/>
+        <a:font script="Java" typeface="Javanese Text"/>
+        <a:font script="Lisu" typeface="Segoe UI"/>
+        <a:font script="Mymr" typeface="Myanmar Text"/>
+        <a:font script="Nkoo" typeface="Ebrima"/>
+        <a:font script="Olck" typeface="Nirmala UI"/>
+        <a:font script="Osma" typeface="Ebrima"/>
+        <a:font script="Phag" typeface="Phagspa"/>
+        <a:font script="Syrn" typeface="Estrangelo Edessa"/>
+        <a:font script="Syrj" typeface="Estrangelo Edessa"/>
+        <a:font script="Syre" typeface="Estrangelo Edessa"/>
+        <a:font script="Sora" typeface="Nirmala UI"/>
+        <a:font script="Tale" typeface="Microsoft Tai Le"/>
+        <a:font script="Talu" typeface="Microsoft New Tai Lue"/>
+        <a:font script="Tfng" typeface="Ebrima"/>
+      </a:minorFont>
+    </a:fontScheme>
+    <a:fmtScheme name="Office">
+      <a:fillStyleLst>
+        <a:solidFill>
+          <a:schemeClr val="phClr"/>
+        </a:solidFill>
+        <a:gradFill rotWithShape="1">
+          <a:gsLst>
+            <a:gs pos="0">
+              <a:schemeClr val="phClr">
+                <a:lumMod val="110000"/>
+                <a:satMod val="105000"/>
+                <a:tint val="67000"/>
+              </a:schemeClr>
+            </a:gs>
+            <a:gs pos="50000">
+              <a:schemeClr val="phClr">
+                <a:lumMod val="105000"/>
+                <a:satMod val="103000"/>
+                <a:tint val="73000"/>
+              </a:schemeClr>
+            </a:gs>
+            <a:gs pos="100000">
+              <a:schemeClr val="phClr">
+                <a:lumMod val="105000"/>
+                <a:satMod val="109000"/>
+                <a:tint val="81000"/>
+              </a:schemeClr>
+            </a:gs>
+          </a:gsLst>
+          <a:lin ang="5400000" scaled="0"/>
+        </a:gradFill>
+        <a:gradFill rotWithShape="1">
+          <a:gsLst>
+            <a:gs pos="0">
+              <a:schemeClr val="phClr">
+                <a:satMod val="103000"/>
+                <a:lumMod val="102000"/>
+                <a:tint val="94000"/>
+              </a:schemeClr>
+            </a:gs>
+            <a:gs pos="50000">
+              <a:schemeClr val="phClr">
+                <a:satMod val="110000"/>
+                <a:lumMod val="100000"/>
+                <a:shade val="100000"/>
+              </a:schemeClr>
+            </a:gs>
+            <a:gs pos="100000">
+              <a:schemeClr val="phClr">
+                <a:lumMod val="99000"/>
+                <a:satMod val="120000"/>
+                <a:shade val="78000"/>
+              </a:schemeClr>
+            </a:gs>
+          </a:gsLst>
+          <a:lin ang="5400000" scaled="0"/>
+        </a:gradFill>
+      </a:fillStyleLst>
+      <a:lnStyleLst>
+        <a:ln w="6350" cap="flat" cmpd="sng" algn="ctr">
+          <a:solidFill>
+            <a:schemeClr val="phClr"/>
+          </a:solidFill>
+          <a:prstDash val="solid"/>
+          <a:miter lim="800000"/>
+        </a:ln>
+        <a:ln w="12700" cap="flat" cmpd="sng" algn="ctr">
+          <a:solidFill>
+            <a:schemeClr val="phClr"/>
+          </a:solidFill>
+          <a:prstDash val="solid"/>
+          <a:miter lim="800000"/>
+        </a:ln>
+        <a:ln w="19050" cap="flat" cmpd="sng" algn="ctr">
+          <a:solidFill>
+            <a:schemeClr val="phClr"/>
+          </a:solidFill>
+          <a:prstDash val="solid"/>
+          <a:miter lim="800000"/>
+        </a:ln>
+      </a:lnStyleLst>
+      <a:effectStyleLst>
+        <a:effectStyle>
+          <a:effectLst/>
+        </a:effectStyle>
+        <a:effectStyle>
+          <a:effectLst/>
+        </a:effectStyle>
+        <a:effectStyle>
+          <a:effectLst>
+            <a:outerShdw blurRad="57150" dist="19050" dir="5400000" algn="ctr" rotWithShape="0">
+              <a:srgbClr val="000000">
+                <a:alpha val="63000"/>
+              </a:srgbClr>
+            </a:outerShdw>
+          </a:effectLst>
+        </a:effectStyle>
+      </a:effectStyleLst>
+      <a:bgFillStyleLst>
+        <a:solidFill>
+          <a:schemeClr val="phClr"/>
+        </a:solidFill>
+        <a:solidFill>
+          <a:schemeClr val="phClr">
+            <a:tint val="95000"/>
+            <a:satMod val="170000"/>
+          </a:schemeClr>
+        </a:solidFill>
+        <a:gradFill rotWithShape="1">
+          <a:gsLst>
+            <a:gs pos="0">
+              <a:schemeClr val="phClr">
+                <a:tint val="93000"/>
+                <a:satMod val="150000"/>
+                <a:shade val="98000"/>
+                <a:lumMod val="102000"/>
+              </a:schemeClr>
+            </a:gs>
+            <a:gs pos="50000">
+              <a:schemeClr val="phClr">
+                <a:tint val="98000"/>
+                <a:satMod val="130000"/>
+                <a:shade val="90000"/>
+                <a:lumMod val="103000"/>
+              </a:schemeClr>
+            </a:gs>
+            <a:gs pos="100000">
+              <a:schemeClr val="phClr">
+                <a:shade val="63000"/>
+                <a:satMod val="120000"/>
+              </a:schemeClr>
+            </a:gs>
+          </a:gsLst>
+          <a:lin ang="5400000" scaled="0"/>
+        </a:gradFill>
+      </a:bgFillStyleLst>
+    </a:fmtScheme>
+  </a:themeElements>
+  <a:objectDefaults/>
+  <a:extraClrSchemeLst/>
+  <a:extLst>
+    <a:ext uri="{05A4C25C-085E-4340-85A3-A5531E510DB2}">
+      <thm15:themeFamily xmlns:thm15="http://schemas.microsoft.com/office/thememl/2012/main" name="Office Theme" id="{62F939B6-93AF-4DB8-9C6B-D6C7DFDC589F}" vid="{4A3C46E8-61CC-4603-A589-7422A47A8E4A}"/>
+    </a:ext>
+  </a:extLst>
+</a:theme>
 </file>
</xml_diff>